<commit_message>
modifica device page invio
</commit_message>
<xml_diff>
--- a/presentazione.pptx
+++ b/presentazione.pptx
@@ -364,7 +364,7 @@
           <a:p>
             <a:fld id="{D28215B0-70A9-403B-AFE3-EF59342E39CC}" type="slidenum">
               <a:rPr lang="en-US" smtClean="0"/>
-              <a:t>‹#›</a:t>
+              <a:t>‹N›</a:t>
             </a:fld>
             <a:endParaRPr lang="en-US"/>
           </a:p>
@@ -562,7 +562,7 @@
           <a:p>
             <a:fld id="{D28215B0-70A9-403B-AFE3-EF59342E39CC}" type="slidenum">
               <a:rPr lang="en-US" smtClean="0"/>
-              <a:t>‹#›</a:t>
+              <a:t>‹N›</a:t>
             </a:fld>
             <a:endParaRPr lang="en-US"/>
           </a:p>
@@ -770,7 +770,7 @@
           <a:p>
             <a:fld id="{D28215B0-70A9-403B-AFE3-EF59342E39CC}" type="slidenum">
               <a:rPr lang="en-US" smtClean="0"/>
-              <a:t>‹#›</a:t>
+              <a:t>‹N›</a:t>
             </a:fld>
             <a:endParaRPr lang="en-US"/>
           </a:p>
@@ -968,7 +968,7 @@
           <a:p>
             <a:fld id="{D28215B0-70A9-403B-AFE3-EF59342E39CC}" type="slidenum">
               <a:rPr lang="en-US" smtClean="0"/>
-              <a:t>‹#›</a:t>
+              <a:t>‹N›</a:t>
             </a:fld>
             <a:endParaRPr lang="en-US"/>
           </a:p>
@@ -1243,7 +1243,7 @@
           <a:p>
             <a:fld id="{D28215B0-70A9-403B-AFE3-EF59342E39CC}" type="slidenum">
               <a:rPr lang="en-US" smtClean="0"/>
-              <a:t>‹#›</a:t>
+              <a:t>‹N›</a:t>
             </a:fld>
             <a:endParaRPr lang="en-US"/>
           </a:p>
@@ -1508,7 +1508,7 @@
           <a:p>
             <a:fld id="{D28215B0-70A9-403B-AFE3-EF59342E39CC}" type="slidenum">
               <a:rPr lang="en-US" smtClean="0"/>
-              <a:t>‹#›</a:t>
+              <a:t>‹N›</a:t>
             </a:fld>
             <a:endParaRPr lang="en-US"/>
           </a:p>
@@ -1920,7 +1920,7 @@
           <a:p>
             <a:fld id="{D28215B0-70A9-403B-AFE3-EF59342E39CC}" type="slidenum">
               <a:rPr lang="en-US" smtClean="0"/>
-              <a:t>‹#›</a:t>
+              <a:t>‹N›</a:t>
             </a:fld>
             <a:endParaRPr lang="en-US"/>
           </a:p>
@@ -2061,7 +2061,7 @@
           <a:p>
             <a:fld id="{D28215B0-70A9-403B-AFE3-EF59342E39CC}" type="slidenum">
               <a:rPr lang="en-US" smtClean="0"/>
-              <a:t>‹#›</a:t>
+              <a:t>‹N›</a:t>
             </a:fld>
             <a:endParaRPr lang="en-US"/>
           </a:p>
@@ -2174,7 +2174,7 @@
           <a:p>
             <a:fld id="{D28215B0-70A9-403B-AFE3-EF59342E39CC}" type="slidenum">
               <a:rPr lang="en-US" smtClean="0"/>
-              <a:t>‹#›</a:t>
+              <a:t>‹N›</a:t>
             </a:fld>
             <a:endParaRPr lang="en-US"/>
           </a:p>
@@ -2485,7 +2485,7 @@
           <a:p>
             <a:fld id="{D28215B0-70A9-403B-AFE3-EF59342E39CC}" type="slidenum">
               <a:rPr lang="en-US" smtClean="0"/>
-              <a:t>‹#›</a:t>
+              <a:t>‹N›</a:t>
             </a:fld>
             <a:endParaRPr lang="en-US"/>
           </a:p>
@@ -2773,7 +2773,7 @@
           <a:p>
             <a:fld id="{D28215B0-70A9-403B-AFE3-EF59342E39CC}" type="slidenum">
               <a:rPr lang="en-US" smtClean="0"/>
-              <a:t>‹#›</a:t>
+              <a:t>‹N›</a:t>
             </a:fld>
             <a:endParaRPr lang="en-US"/>
           </a:p>
@@ -3050,7 +3050,7 @@
           <a:p>
             <a:fld id="{D28215B0-70A9-403B-AFE3-EF59342E39CC}" type="slidenum">
               <a:rPr lang="en-US" smtClean="0"/>
-              <a:t>‹#›</a:t>
+              <a:t>‹N›</a:t>
             </a:fld>
             <a:endParaRPr lang="en-US"/>
           </a:p>
@@ -20939,8 +20939,8 @@
         </p:nvSpPr>
         <p:spPr>
           <a:xfrm>
-            <a:off x="666608" y="3933525"/>
-            <a:ext cx="3495834" cy="1169551"/>
+            <a:off x="628785" y="3446727"/>
+            <a:ext cx="3495834" cy="1384995"/>
           </a:xfrm>
           <a:prstGeom prst="rect">
             <a:avLst/>
@@ -20954,13 +20954,60 @@
           <a:lstStyle/>
           <a:p>
             <a:r>
+              <a:rPr lang="en-US" sz="1400" u="sng" dirty="0">
+                <a:solidFill>
+                  <a:srgbClr val="A5A5A5"/>
+                </a:solidFill>
+                <a:latin typeface="The Sans Light-" panose="02000503050000020004" pitchFamily="2" charset="0"/>
+              </a:rPr>
+              <a:t>Che </a:t>
+            </a:r>
+            <a:r>
+              <a:rPr lang="en-US" sz="1400" u="sng" dirty="0" err="1">
+                <a:solidFill>
+                  <a:srgbClr val="A5A5A5"/>
+                </a:solidFill>
+                <a:latin typeface="The Sans Light-" panose="02000503050000020004" pitchFamily="2" charset="0"/>
+              </a:rPr>
+              <a:t>cosa</a:t>
+            </a:r>
+            <a:r>
+              <a:rPr lang="en-US" sz="1400" u="sng" dirty="0">
+                <a:solidFill>
+                  <a:srgbClr val="A5A5A5"/>
+                </a:solidFill>
+                <a:latin typeface="The Sans Light-" panose="02000503050000020004" pitchFamily="2" charset="0"/>
+              </a:rPr>
+              <a:t> è corvina cloud?</a:t>
+            </a:r>
+          </a:p>
+          <a:p>
+            <a:r>
               <a:rPr lang="en-US" sz="1400" dirty="0">
                 <a:solidFill>
                   <a:srgbClr val="A5A5A5"/>
                 </a:solidFill>
                 <a:latin typeface="The Sans Light-" panose="02000503050000020004" pitchFamily="2" charset="0"/>
               </a:rPr>
-              <a:t>Lorem ipsum dolor sit amet, consectetuer adipiscing elit. Maecenas porttitor congue massa. Fusce posuere, magna sed pulvinar ultricies, purus lectus malesuada libero, sit amet commodo magna eros quis </a:t>
+              <a:t>Corvina cloud è un cloud </a:t>
+            </a:r>
+            <a:r>
+              <a:rPr lang="it-IT" sz="1400" dirty="0">
+                <a:solidFill>
+                  <a:srgbClr val="A5A5A5"/>
+                </a:solidFill>
+                <a:latin typeface="The Sans Light-" panose="02000503050000020004" pitchFamily="2" charset="0"/>
+              </a:rPr>
+              <a:t>che</a:t>
+            </a:r>
+            <a:r>
+              <a:rPr lang="en-US" sz="1400" dirty="0">
+                <a:solidFill>
+                  <a:srgbClr val="A5A5A5"/>
+                </a:solidFill>
+                <a:latin typeface="The Sans Light-" panose="02000503050000020004" pitchFamily="2" charset="0"/>
+              </a:rPr>
+              <a:t> </a:t>
             </a:r>
             <a:r>
               <a:rPr lang="en-US" sz="1400" dirty="0" err="1">
@@ -20969,7 +21016,7 @@
                 </a:solidFill>
                 <a:latin typeface="The Sans Light-" panose="02000503050000020004" pitchFamily="2" charset="0"/>
               </a:rPr>
-              <a:t>urna</a:t>
+              <a:t>rende</a:t>
             </a:r>
             <a:r>
               <a:rPr lang="en-US" sz="1400" dirty="0">
@@ -20978,7 +21025,252 @@
                 </a:solidFill>
                 <a:latin typeface="The Sans Light-" panose="02000503050000020004" pitchFamily="2" charset="0"/>
               </a:rPr>
+              <a:t> possible il </a:t>
+            </a:r>
+            <a:r>
+              <a:rPr lang="en-US" sz="1400" dirty="0" err="1">
+                <a:solidFill>
+                  <a:srgbClr val="A5A5A5"/>
+                </a:solidFill>
+                <a:latin typeface="The Sans Light-" panose="02000503050000020004" pitchFamily="2" charset="0"/>
+              </a:rPr>
+              <a:t>monitoraggio</a:t>
+            </a:r>
+            <a:r>
+              <a:rPr lang="en-US" sz="1400" dirty="0">
+                <a:solidFill>
+                  <a:srgbClr val="A5A5A5"/>
+                </a:solidFill>
+                <a:latin typeface="The Sans Light-" panose="02000503050000020004" pitchFamily="2" charset="0"/>
+              </a:rPr>
+              <a:t>, </a:t>
+            </a:r>
+            <a:r>
+              <a:rPr lang="en-US" sz="1400" dirty="0" err="1">
+                <a:solidFill>
+                  <a:srgbClr val="A5A5A5"/>
+                </a:solidFill>
+                <a:latin typeface="The Sans Light-" panose="02000503050000020004" pitchFamily="2" charset="0"/>
+              </a:rPr>
+              <a:t>analisi</a:t>
+            </a:r>
+            <a:r>
+              <a:rPr lang="en-US" sz="1400" dirty="0">
+                <a:solidFill>
+                  <a:srgbClr val="A5A5A5"/>
+                </a:solidFill>
+                <a:latin typeface="The Sans Light-" panose="02000503050000020004" pitchFamily="2" charset="0"/>
+              </a:rPr>
+              <a:t> e </a:t>
+            </a:r>
+            <a:r>
+              <a:rPr lang="en-US" sz="1400" dirty="0" err="1">
+                <a:solidFill>
+                  <a:srgbClr val="A5A5A5"/>
+                </a:solidFill>
+                <a:latin typeface="The Sans Light-" panose="02000503050000020004" pitchFamily="2" charset="0"/>
+              </a:rPr>
+              <a:t>controllo</a:t>
+            </a:r>
+            <a:r>
+              <a:rPr lang="en-US" sz="1400" dirty="0">
+                <a:solidFill>
+                  <a:srgbClr val="A5A5A5"/>
+                </a:solidFill>
+                <a:latin typeface="The Sans Light-" panose="02000503050000020004" pitchFamily="2" charset="0"/>
+              </a:rPr>
+              <a:t> di </a:t>
+            </a:r>
+            <a:r>
+              <a:rPr lang="en-US" sz="1400" dirty="0" err="1">
+                <a:solidFill>
+                  <a:srgbClr val="A5A5A5"/>
+                </a:solidFill>
+                <a:latin typeface="The Sans Light-" panose="02000503050000020004" pitchFamily="2" charset="0"/>
+              </a:rPr>
+              <a:t>dati</a:t>
+            </a:r>
+            <a:r>
+              <a:rPr lang="en-US" sz="1400" dirty="0">
+                <a:solidFill>
+                  <a:srgbClr val="A5A5A5"/>
+                </a:solidFill>
+                <a:latin typeface="The Sans Light-" panose="02000503050000020004" pitchFamily="2" charset="0"/>
+              </a:rPr>
+              <a:t> per porter </a:t>
+            </a:r>
+            <a:r>
+              <a:rPr lang="en-US" sz="1400" dirty="0" err="1">
+                <a:solidFill>
+                  <a:srgbClr val="A5A5A5"/>
+                </a:solidFill>
+                <a:latin typeface="The Sans Light-" panose="02000503050000020004" pitchFamily="2" charset="0"/>
+              </a:rPr>
+              <a:t>avere</a:t>
+            </a:r>
+            <a:r>
+              <a:rPr lang="en-US" sz="1400" dirty="0">
+                <a:solidFill>
+                  <a:srgbClr val="A5A5A5"/>
+                </a:solidFill>
+                <a:latin typeface="The Sans Light-" panose="02000503050000020004" pitchFamily="2" charset="0"/>
+              </a:rPr>
+              <a:t> </a:t>
+            </a:r>
+            <a:r>
+              <a:rPr lang="en-US" sz="1400" dirty="0" err="1">
+                <a:solidFill>
+                  <a:srgbClr val="A5A5A5"/>
+                </a:solidFill>
+                <a:latin typeface="The Sans Light-" panose="02000503050000020004" pitchFamily="2" charset="0"/>
+              </a:rPr>
+              <a:t>una</a:t>
+            </a:r>
+            <a:r>
+              <a:rPr lang="en-US" sz="1400" dirty="0">
+                <a:solidFill>
+                  <a:srgbClr val="A5A5A5"/>
+                </a:solidFill>
+                <a:latin typeface="The Sans Light-" panose="02000503050000020004" pitchFamily="2" charset="0"/>
+              </a:rPr>
+              <a:t> </a:t>
+            </a:r>
+            <a:r>
+              <a:rPr lang="en-US" sz="1400" dirty="0" err="1">
+                <a:solidFill>
+                  <a:srgbClr val="A5A5A5"/>
+                </a:solidFill>
+                <a:latin typeface="The Sans Light-" panose="02000503050000020004" pitchFamily="2" charset="0"/>
+              </a:rPr>
+              <a:t>gestione</a:t>
+            </a:r>
+            <a:r>
+              <a:rPr lang="en-US" sz="1400" dirty="0">
+                <a:solidFill>
+                  <a:srgbClr val="A5A5A5"/>
+                </a:solidFill>
+                <a:latin typeface="The Sans Light-" panose="02000503050000020004" pitchFamily="2" charset="0"/>
+              </a:rPr>
+              <a:t> di </a:t>
+            </a:r>
+            <a:r>
+              <a:rPr lang="en-US" sz="1400" dirty="0" err="1">
+                <a:solidFill>
+                  <a:srgbClr val="A5A5A5"/>
+                </a:solidFill>
+                <a:latin typeface="The Sans Light-" panose="02000503050000020004" pitchFamily="2" charset="0"/>
+              </a:rPr>
+              <a:t>oggetti</a:t>
+            </a:r>
+            <a:r>
+              <a:rPr lang="en-US" sz="1400" dirty="0">
+                <a:solidFill>
+                  <a:srgbClr val="A5A5A5"/>
+                </a:solidFill>
+                <a:latin typeface="The Sans Light-" panose="02000503050000020004" pitchFamily="2" charset="0"/>
+              </a:rPr>
+              <a:t> (IoT) in modo semplice, </a:t>
+            </a:r>
+            <a:r>
+              <a:rPr lang="en-US" sz="1400" dirty="0" err="1">
+                <a:solidFill>
+                  <a:srgbClr val="A5A5A5"/>
+                </a:solidFill>
+                <a:latin typeface="The Sans Light-" panose="02000503050000020004" pitchFamily="2" charset="0"/>
+              </a:rPr>
+              <a:t>inuitivo</a:t>
+            </a:r>
+            <a:r>
+              <a:rPr lang="en-US" sz="1400" dirty="0">
+                <a:solidFill>
+                  <a:srgbClr val="A5A5A5"/>
+                </a:solidFill>
+                <a:latin typeface="The Sans Light-" panose="02000503050000020004" pitchFamily="2" charset="0"/>
+              </a:rPr>
+              <a:t> e </a:t>
+            </a:r>
+            <a:r>
+              <a:rPr lang="en-US" sz="1400" dirty="0" err="1">
+                <a:solidFill>
+                  <a:srgbClr val="A5A5A5"/>
+                </a:solidFill>
+                <a:latin typeface="The Sans Light-" panose="02000503050000020004" pitchFamily="2" charset="0"/>
+              </a:rPr>
+              <a:t>ottimizzato</a:t>
+            </a:r>
+            <a:r>
+              <a:rPr lang="en-US" sz="1400" dirty="0">
+                <a:solidFill>
+                  <a:srgbClr val="A5A5A5"/>
+                </a:solidFill>
+                <a:latin typeface="The Sans Light-" panose="02000503050000020004" pitchFamily="2" charset="0"/>
+              </a:rPr>
               <a:t>.</a:t>
+            </a:r>
+          </a:p>
+          <a:p>
+            <a:r>
+              <a:rPr lang="en-US" sz="1400" dirty="0">
+                <a:solidFill>
+                  <a:srgbClr val="A5A5A5"/>
+                </a:solidFill>
+                <a:latin typeface="The Sans Light-" panose="02000503050000020004" pitchFamily="2" charset="0"/>
+              </a:rPr>
+              <a:t>La nostra </a:t>
+            </a:r>
+            <a:r>
+              <a:rPr lang="en-US" sz="1400" dirty="0" err="1">
+                <a:solidFill>
+                  <a:srgbClr val="A5A5A5"/>
+                </a:solidFill>
+                <a:latin typeface="The Sans Light-" panose="02000503050000020004" pitchFamily="2" charset="0"/>
+              </a:rPr>
+              <a:t>applicazione</a:t>
+            </a:r>
+            <a:r>
+              <a:rPr lang="en-US" sz="1400" dirty="0">
+                <a:solidFill>
+                  <a:srgbClr val="A5A5A5"/>
+                </a:solidFill>
+                <a:latin typeface="The Sans Light-" panose="02000503050000020004" pitchFamily="2" charset="0"/>
+              </a:rPr>
+              <a:t> </a:t>
+            </a:r>
+            <a:r>
+              <a:rPr lang="en-US" sz="1400" dirty="0" err="1">
+                <a:solidFill>
+                  <a:srgbClr val="A5A5A5"/>
+                </a:solidFill>
+                <a:latin typeface="The Sans Light-" panose="02000503050000020004" pitchFamily="2" charset="0"/>
+              </a:rPr>
+              <a:t>rende</a:t>
+            </a:r>
+            <a:r>
+              <a:rPr lang="en-US" sz="1400" dirty="0">
+                <a:solidFill>
+                  <a:srgbClr val="A5A5A5"/>
+                </a:solidFill>
+                <a:latin typeface="The Sans Light-" panose="02000503050000020004" pitchFamily="2" charset="0"/>
+              </a:rPr>
+              <a:t> </a:t>
+            </a:r>
+            <a:r>
+              <a:rPr lang="en-US" sz="1400" dirty="0" err="1">
+                <a:solidFill>
+                  <a:srgbClr val="A5A5A5"/>
+                </a:solidFill>
+                <a:latin typeface="The Sans Light-" panose="02000503050000020004" pitchFamily="2" charset="0"/>
+              </a:rPr>
+              <a:t>quindi</a:t>
+            </a:r>
+            <a:r>
+              <a:rPr lang="en-US" sz="1400" dirty="0">
+                <a:solidFill>
+                  <a:srgbClr val="A5A5A5"/>
+                </a:solidFill>
+                <a:latin typeface="The Sans Light-" panose="02000503050000020004" pitchFamily="2" charset="0"/>
+              </a:rPr>
+              <a:t> possible:</a:t>
             </a:r>
           </a:p>
         </p:txBody>
@@ -20997,8 +21289,8 @@
         </p:nvSpPr>
         <p:spPr>
           <a:xfrm>
-            <a:off x="4468752" y="3933525"/>
-            <a:ext cx="3225113" cy="1369606"/>
+            <a:off x="4467258" y="3508769"/>
+            <a:ext cx="3225113" cy="1208023"/>
           </a:xfrm>
           <a:prstGeom prst="rect">
             <a:avLst/>
@@ -21022,29 +21314,14 @@
               <a:buChar char="§"/>
             </a:pPr>
             <a:r>
-              <a:rPr lang="en-US" sz="1050" dirty="0">
+              <a:rPr lang="it-IT" sz="1050" dirty="0">
                 <a:solidFill>
                   <a:schemeClr val="bg1"/>
                 </a:solidFill>
                 <a:latin typeface="The Sans Light-" panose="02000503050000020004" pitchFamily="2" charset="0"/>
               </a:rPr>
-              <a:t>Lorem ipsum dolor sit amet, </a:t>
-            </a:r>
-            <a:r>
-              <a:rPr lang="en-US" sz="1050" dirty="0" err="1">
-                <a:solidFill>
-                  <a:schemeClr val="bg1"/>
-                </a:solidFill>
-                <a:latin typeface="The Sans Light-" panose="02000503050000020004" pitchFamily="2" charset="0"/>
-              </a:rPr>
-              <a:t>consectetuer</a:t>
-            </a:r>
-            <a:endParaRPr lang="en-US" sz="1050" dirty="0">
-              <a:solidFill>
-                <a:schemeClr val="bg1"/>
-              </a:solidFill>
-              <a:latin typeface="The Sans Light-" panose="02000503050000020004" pitchFamily="2" charset="0"/>
-            </a:endParaRPr>
+              <a:t>Visualizzazione delle organizzazioni di appartenenza</a:t>
+            </a:r>
           </a:p>
           <a:p>
             <a:pPr marL="171450" indent="-171450">
@@ -21058,29 +21335,14 @@
               <a:buChar char="§"/>
             </a:pPr>
             <a:r>
-              <a:rPr lang="en-US" sz="1050" dirty="0">
+              <a:rPr lang="it-IT" sz="1050" dirty="0">
                 <a:solidFill>
                   <a:schemeClr val="bg1"/>
                 </a:solidFill>
                 <a:latin typeface="The Sans Light-" panose="02000503050000020004" pitchFamily="2" charset="0"/>
               </a:rPr>
-              <a:t>Lorem ipsum dolor sit </a:t>
-            </a:r>
-            <a:r>
-              <a:rPr lang="en-US" sz="1050" dirty="0" err="1">
-                <a:solidFill>
-                  <a:schemeClr val="bg1"/>
-                </a:solidFill>
-                <a:latin typeface="The Sans Light-" panose="02000503050000020004" pitchFamily="2" charset="0"/>
-              </a:rPr>
-              <a:t>ametr</a:t>
-            </a:r>
-            <a:endParaRPr lang="en-US" sz="1050" dirty="0">
-              <a:solidFill>
-                <a:schemeClr val="bg1"/>
-              </a:solidFill>
-              <a:latin typeface="The Sans Light-" panose="02000503050000020004" pitchFamily="2" charset="0"/>
-            </a:endParaRPr>
+              <a:t>Gestione dei dispositivi</a:t>
+            </a:r>
           </a:p>
           <a:p>
             <a:pPr marL="171450" indent="-171450">
@@ -21094,65 +21356,14 @@
               <a:buChar char="§"/>
             </a:pPr>
             <a:r>
-              <a:rPr lang="en-US" sz="1050" dirty="0">
+              <a:rPr lang="it-IT" sz="1050" dirty="0">
                 <a:solidFill>
                   <a:schemeClr val="bg1"/>
                 </a:solidFill>
                 <a:latin typeface="The Sans Light-" panose="02000503050000020004" pitchFamily="2" charset="0"/>
               </a:rPr>
-              <a:t>Lorem ipsum dolor sit </a:t>
-            </a:r>
-            <a:r>
-              <a:rPr lang="en-US" sz="1050" dirty="0" err="1">
-                <a:solidFill>
-                  <a:schemeClr val="bg1"/>
-                </a:solidFill>
-                <a:latin typeface="The Sans Light-" panose="02000503050000020004" pitchFamily="2" charset="0"/>
-              </a:rPr>
-              <a:t>amet</a:t>
-            </a:r>
-            <a:r>
-              <a:rPr lang="en-US" sz="1050" dirty="0">
-                <a:solidFill>
-                  <a:schemeClr val="bg1"/>
-                </a:solidFill>
-                <a:latin typeface="The Sans Light-" panose="02000503050000020004" pitchFamily="2" charset="0"/>
-              </a:rPr>
-              <a:t>, Lorem ipsum dolor sit </a:t>
-            </a:r>
-            <a:r>
-              <a:rPr lang="en-US" sz="1050" dirty="0" err="1">
-                <a:solidFill>
-                  <a:schemeClr val="bg1"/>
-                </a:solidFill>
-                <a:latin typeface="The Sans Light-" panose="02000503050000020004" pitchFamily="2" charset="0"/>
-              </a:rPr>
-              <a:t>amet</a:t>
-            </a:r>
-            <a:r>
-              <a:rPr lang="en-US" sz="1050" dirty="0">
-                <a:solidFill>
-                  <a:schemeClr val="bg1"/>
-                </a:solidFill>
-                <a:latin typeface="The Sans Light-" panose="02000503050000020004" pitchFamily="2" charset="0"/>
-              </a:rPr>
-              <a:t>, </a:t>
-            </a:r>
-            <a:r>
-              <a:rPr lang="en-US" sz="1050" dirty="0" err="1">
-                <a:solidFill>
-                  <a:schemeClr val="bg1"/>
-                </a:solidFill>
-                <a:latin typeface="The Sans Light-" panose="02000503050000020004" pitchFamily="2" charset="0"/>
-              </a:rPr>
-              <a:t>consectetuer</a:t>
-            </a:r>
-            <a:endParaRPr lang="en-US" sz="1050" dirty="0">
-              <a:solidFill>
-                <a:schemeClr val="bg1"/>
-              </a:solidFill>
-              <a:latin typeface="The Sans Light-" panose="02000503050000020004" pitchFamily="2" charset="0"/>
-            </a:endParaRPr>
+              <a:t>Controllo dei dispositivi tramite allarmi </a:t>
+            </a:r>
           </a:p>
           <a:p>
             <a:pPr marL="171450" indent="-171450">
@@ -21166,47 +21377,14 @@
               <a:buChar char="§"/>
             </a:pPr>
             <a:r>
-              <a:rPr lang="en-US" sz="1050" dirty="0">
+              <a:rPr lang="it-IT" sz="1050" dirty="0">
                 <a:solidFill>
                   <a:schemeClr val="bg1"/>
                 </a:solidFill>
                 <a:latin typeface="The Sans Light-" panose="02000503050000020004" pitchFamily="2" charset="0"/>
               </a:rPr>
-              <a:t>Lorem ipsum dolor sit </a:t>
-            </a:r>
-            <a:r>
-              <a:rPr lang="en-US" sz="1050" dirty="0" err="1">
-                <a:solidFill>
-                  <a:schemeClr val="bg1"/>
-                </a:solidFill>
-                <a:latin typeface="The Sans Light-" panose="02000503050000020004" pitchFamily="2" charset="0"/>
-              </a:rPr>
-              <a:t>amet</a:t>
-            </a:r>
-            <a:r>
-              <a:rPr lang="en-US" sz="1050" dirty="0">
-                <a:solidFill>
-                  <a:schemeClr val="bg1"/>
-                </a:solidFill>
-                <a:latin typeface="The Sans Light-" panose="02000503050000020004" pitchFamily="2" charset="0"/>
-              </a:rPr>
-              <a:t>, </a:t>
-            </a:r>
-            <a:r>
-              <a:rPr lang="en-US" sz="1050" dirty="0" err="1">
-                <a:solidFill>
-                  <a:schemeClr val="bg1"/>
-                </a:solidFill>
-                <a:latin typeface="The Sans Light-" panose="02000503050000020004" pitchFamily="2" charset="0"/>
-              </a:rPr>
-              <a:t>consectetuer</a:t>
-            </a:r>
-            <a:endParaRPr lang="en-US" sz="1050" dirty="0">
-              <a:solidFill>
-                <a:schemeClr val="bg1"/>
-              </a:solidFill>
-              <a:latin typeface="The Sans Light-" panose="02000503050000020004" pitchFamily="2" charset="0"/>
-            </a:endParaRPr>
+              <a:t>Analisi e verifica di dati tramite appositi tag</a:t>
+            </a:r>
           </a:p>
           <a:p>
             <a:pPr marL="171450" indent="-171450">
@@ -21220,13 +21398,13 @@
               <a:buChar char="§"/>
             </a:pPr>
             <a:r>
-              <a:rPr lang="en-US" sz="1050" dirty="0">
+              <a:rPr lang="it-IT" sz="1050" dirty="0">
                 <a:solidFill>
                   <a:schemeClr val="bg1"/>
                 </a:solidFill>
                 <a:latin typeface="The Sans Light-" panose="02000503050000020004" pitchFamily="2" charset="0"/>
               </a:rPr>
-              <a:t>Lorem Ipsum</a:t>
+              <a:t>Gestione di Dashboard</a:t>
             </a:r>
           </a:p>
         </p:txBody>
@@ -23633,7 +23811,79 @@
                 </a:solidFill>
                 <a:latin typeface="The Sans Light-" panose="02000503050000020004" pitchFamily="2" charset="0"/>
               </a:rPr>
-              <a:t>Lorem ipsum dolor sit amet, consectetuer adipiscing elit. Maecenas </a:t>
+              <a:t>Lorem ipsum dolor sit </a:t>
+            </a:r>
+            <a:r>
+              <a:rPr lang="en-US" sz="1050" dirty="0" err="1">
+                <a:solidFill>
+                  <a:schemeClr val="bg1"/>
+                </a:solidFill>
+                <a:latin typeface="The Sans Light-" panose="02000503050000020004" pitchFamily="2" charset="0"/>
+              </a:rPr>
+              <a:t>amet</a:t>
+            </a:r>
+            <a:r>
+              <a:rPr lang="en-US" sz="1050" dirty="0">
+                <a:solidFill>
+                  <a:schemeClr val="bg1"/>
+                </a:solidFill>
+                <a:latin typeface="The Sans Light-" panose="02000503050000020004" pitchFamily="2" charset="0"/>
+              </a:rPr>
+              <a:t>, </a:t>
+            </a:r>
+            <a:r>
+              <a:rPr lang="en-US" sz="1050" dirty="0" err="1">
+                <a:solidFill>
+                  <a:schemeClr val="bg1"/>
+                </a:solidFill>
+                <a:latin typeface="The Sans Light-" panose="02000503050000020004" pitchFamily="2" charset="0"/>
+              </a:rPr>
+              <a:t>consectetuer</a:t>
+            </a:r>
+            <a:r>
+              <a:rPr lang="en-US" sz="1050" dirty="0">
+                <a:solidFill>
+                  <a:schemeClr val="bg1"/>
+                </a:solidFill>
+                <a:latin typeface="The Sans Light-" panose="02000503050000020004" pitchFamily="2" charset="0"/>
+              </a:rPr>
+              <a:t> </a:t>
+            </a:r>
+            <a:r>
+              <a:rPr lang="en-US" sz="1050" dirty="0" err="1">
+                <a:solidFill>
+                  <a:schemeClr val="bg1"/>
+                </a:solidFill>
+                <a:latin typeface="The Sans Light-" panose="02000503050000020004" pitchFamily="2" charset="0"/>
+              </a:rPr>
+              <a:t>adipiscing</a:t>
+            </a:r>
+            <a:r>
+              <a:rPr lang="en-US" sz="1050" dirty="0">
+                <a:solidFill>
+                  <a:schemeClr val="bg1"/>
+                </a:solidFill>
+                <a:latin typeface="The Sans Light-" panose="02000503050000020004" pitchFamily="2" charset="0"/>
+              </a:rPr>
+              <a:t> </a:t>
+            </a:r>
+            <a:r>
+              <a:rPr lang="en-US" sz="1050" dirty="0" err="1">
+                <a:solidFill>
+                  <a:schemeClr val="bg1"/>
+                </a:solidFill>
+                <a:latin typeface="The Sans Light-" panose="02000503050000020004" pitchFamily="2" charset="0"/>
+              </a:rPr>
+              <a:t>elit</a:t>
+            </a:r>
+            <a:r>
+              <a:rPr lang="en-US" sz="1050" dirty="0">
+                <a:solidFill>
+                  <a:schemeClr val="bg1"/>
+                </a:solidFill>
+                <a:latin typeface="The Sans Light-" panose="02000503050000020004" pitchFamily="2" charset="0"/>
+              </a:rPr>
+              <a:t>. Maecenas </a:t>
             </a:r>
             <a:r>
               <a:rPr lang="en-US" sz="1050" dirty="0" err="1">

</xml_diff>